<commit_message>
Exported PDF that explains programming structure
</commit_message>
<xml_diff>
--- a/private/m2doc_Workflow_V100_21-06-17.pptx
+++ b/private/m2doc_Workflow_V100_21-06-17.pptx
@@ -292,7 +292,7 @@
               <a:pPr>
                 <a:defRPr/>
               </a:pPr>
-              <a:t>7/7/2021</a:t>
+              <a:t>7/22/2021</a:t>
             </a:fld>
             <a:endParaRPr lang="en-US"/>
           </a:p>
@@ -515,7 +515,7 @@
               <a:pPr>
                 <a:defRPr/>
               </a:pPr>
-              <a:t>7/7/2021</a:t>
+              <a:t>7/22/2021</a:t>
             </a:fld>
             <a:endParaRPr lang="en-US"/>
           </a:p>
@@ -1992,52 +1992,34 @@
               <a:rPr lang="de-DE" altLang="de-DE" sz="700" b="1" noProof="0" dirty="0">
                 <a:latin typeface="Verdana" panose="020B0604030504040204" pitchFamily="34" charset="0"/>
               </a:rPr>
-              <a:t>. </a:t>
-            </a:r>
-            <a:r>
-              <a:rPr lang="de-DE" altLang="de-DE" sz="700" b="1" noProof="0" dirty="0" smtClean="0">
-                <a:latin typeface="Verdana" panose="020B0604030504040204" pitchFamily="34" charset="0"/>
-              </a:rPr>
-              <a:t>, Pierre Ollfisch </a:t>
-            </a:r>
-            <a:r>
-              <a:rPr lang="de-DE" altLang="de-DE" sz="700" b="1" noProof="0" dirty="0" err="1" smtClean="0">
+              <a:t>. , Pierre Ollfisch </a:t>
+            </a:r>
+            <a:r>
+              <a:rPr lang="de-DE" altLang="de-DE" sz="700" b="1" noProof="0" dirty="0" err="1">
                 <a:latin typeface="Verdana" panose="020B0604030504040204" pitchFamily="34" charset="0"/>
               </a:rPr>
               <a:t>M.Sc</a:t>
             </a:r>
             <a:r>
-              <a:rPr lang="de-DE" altLang="de-DE" sz="700" b="1" noProof="0" dirty="0" smtClean="0">
+              <a:rPr lang="de-DE" altLang="de-DE" sz="700" b="1" noProof="0" dirty="0">
                 <a:latin typeface="Verdana" panose="020B0604030504040204" pitchFamily="34" charset="0"/>
               </a:rPr>
               <a:t>.</a:t>
             </a:r>
             <a:r>
-              <a:rPr lang="de-DE" altLang="de-DE" sz="700" b="1" baseline="0" noProof="0" dirty="0" smtClean="0">
+              <a:rPr lang="de-DE" altLang="de-DE" sz="700" b="1" baseline="0" noProof="0" dirty="0">
                 <a:latin typeface="Verdana" panose="020B0604030504040204" pitchFamily="34" charset="0"/>
               </a:rPr>
               <a:t> </a:t>
             </a:r>
             <a:r>
-              <a:rPr lang="de-DE" altLang="de-DE" sz="700" b="1" noProof="0" dirty="0" smtClean="0">
-                <a:latin typeface="Verdana" panose="020B0604030504040204" pitchFamily="34" charset="0"/>
-              </a:rPr>
-              <a:t>, </a:t>
-            </a:r>
-            <a:r>
               <a:rPr lang="de-DE" altLang="de-DE" sz="700" b="1" noProof="0" dirty="0">
                 <a:latin typeface="Verdana" panose="020B0604030504040204" pitchFamily="34" charset="0"/>
               </a:rPr>
-              <a:t>FH </a:t>
-            </a:r>
-            <a:r>
-              <a:rPr lang="de-DE" altLang="de-DE" sz="700" b="1" noProof="0" dirty="0" smtClean="0">
-                <a:latin typeface="Verdana" panose="020B0604030504040204" pitchFamily="34" charset="0"/>
-              </a:rPr>
-              <a:t>AACHEN	</a:t>
-            </a:r>
-            <a:r>
-              <a:rPr lang="de-DE" altLang="de-DE" sz="700" noProof="0" dirty="0" smtClean="0">
+              <a:t>, FH AACHEN	</a:t>
+            </a:r>
+            <a:r>
+              <a:rPr lang="de-DE" altLang="de-DE" sz="700" noProof="0" dirty="0">
                 <a:latin typeface="Verdana" panose="020B0604030504040204" pitchFamily="34" charset="0"/>
               </a:rPr>
               <a:t>| </a:t>
@@ -2448,7 +2430,7 @@
       </a:lvl9pPr>
     </p:otherStyle>
   </p:txStyles>
-  <p:extLst mod="1">
+  <p:extLst>
     <p:ext uri="{27BBF7A9-308A-43DC-89C8-2F10F3537804}">
       <p15:sldGuideLst xmlns:p15="http://schemas.microsoft.com/office/powerpoint/2012/main"/>
     </p:ext>
@@ -8527,7 +8509,35 @@
           <a:bodyPr/>
           <a:lstStyle/>
           <a:p>
-            <a:endParaRPr lang="de-DE"/>
+            <a:r>
+              <a:rPr lang="de-DE" dirty="0" err="1"/>
+              <a:t>Creating</a:t>
+            </a:r>
+            <a:r>
+              <a:rPr lang="de-DE" dirty="0"/>
+              <a:t> </a:t>
+            </a:r>
+            <a:r>
+              <a:rPr lang="de-DE" dirty="0" err="1"/>
+              <a:t>the</a:t>
+            </a:r>
+            <a:r>
+              <a:rPr lang="de-DE" dirty="0"/>
+              <a:t> </a:t>
+            </a:r>
+            <a:r>
+              <a:rPr lang="de-DE" dirty="0" err="1"/>
+              <a:t>documentation</a:t>
+            </a:r>
+            <a:r>
+              <a:rPr lang="de-DE" dirty="0"/>
+              <a:t> </a:t>
+            </a:r>
+            <a:r>
+              <a:rPr lang="de-DE" dirty="0" err="1"/>
+              <a:t>site</a:t>
+            </a:r>
+            <a:endParaRPr lang="de-DE" dirty="0"/>
           </a:p>
         </p:txBody>
       </p:sp>
@@ -8554,23 +8564,11 @@
           <a:p>
             <a:r>
               <a:rPr lang="de-DE" dirty="0"/>
-              <a:t>Workflow </a:t>
-            </a:r>
-            <a:r>
-              <a:rPr lang="de-DE" dirty="0" smtClean="0"/>
-              <a:t>Leve</a:t>
-            </a:r>
-            <a:r>
-              <a:rPr lang="de-DE" dirty="0" smtClean="0"/>
-              <a:t>l </a:t>
-            </a:r>
-            <a:r>
-              <a:rPr lang="de-DE" dirty="0"/>
-              <a:t>3: </a:t>
+              <a:t>Workflow Level 3: </a:t>
             </a:r>
             <a:r>
               <a:rPr lang="de-DE" dirty="0" err="1"/>
-              <a:t>Creating</a:t>
+              <a:t>TemplateHTML</a:t>
             </a:r>
             <a:r>
               <a:rPr lang="de-DE" dirty="0"/>
@@ -8578,23 +8576,7 @@
             </a:r>
             <a:r>
               <a:rPr lang="de-DE" dirty="0" err="1"/>
-              <a:t>the</a:t>
-            </a:r>
-            <a:r>
-              <a:rPr lang="de-DE" dirty="0"/>
-              <a:t> </a:t>
-            </a:r>
-            <a:r>
-              <a:rPr lang="de-DE" dirty="0" err="1"/>
-              <a:t>documentation</a:t>
-            </a:r>
-            <a:r>
-              <a:rPr lang="de-DE" dirty="0"/>
-              <a:t> </a:t>
-            </a:r>
-            <a:r>
-              <a:rPr lang="de-DE" dirty="0" err="1"/>
-              <a:t>site</a:t>
+              <a:t>Object</a:t>
             </a:r>
             <a:endParaRPr lang="de-DE" dirty="0"/>
           </a:p>

</xml_diff>

<commit_message>
Updated structure pdf with new name
</commit_message>
<xml_diff>
--- a/private/m2doc_Workflow_V100_21-06-17.pptx
+++ b/private/m2doc_Workflow_V100_21-06-17.pptx
@@ -292,7 +292,7 @@
               <a:pPr>
                 <a:defRPr/>
               </a:pPr>
-              <a:t>7/22/2021</a:t>
+              <a:t>7/23/2021</a:t>
             </a:fld>
             <a:endParaRPr lang="en-US"/>
           </a:p>
@@ -515,7 +515,7 @@
               <a:pPr>
                 <a:defRPr/>
               </a:pPr>
-              <a:t>7/22/2021</a:t>
+              <a:t>7/23/2021</a:t>
             </a:fld>
             <a:endParaRPr lang="en-US"/>
           </a:p>
@@ -2569,36 +2569,6 @@
           </a:p>
         </p:txBody>
       </p:sp>
-      <p:pic>
-        <p:nvPicPr>
-          <p:cNvPr id="12" name="Grafik 11"/>
-          <p:cNvPicPr>
-            <a:picLocks noChangeAspect="1"/>
-          </p:cNvPicPr>
-          <p:nvPr/>
-        </p:nvPicPr>
-        <p:blipFill>
-          <a:blip r:embed="rId3">
-            <a:extLst>
-              <a:ext uri="{28A0092B-C50C-407E-A947-70E740481C1C}">
-                <a14:useLocalDpi xmlns:a14="http://schemas.microsoft.com/office/drawing/2010/main" val="0"/>
-              </a:ext>
-            </a:extLst>
-          </a:blip>
-          <a:stretch>
-            <a:fillRect/>
-          </a:stretch>
-        </p:blipFill>
-        <p:spPr>
-          <a:xfrm>
-            <a:off x="407816" y="183309"/>
-            <a:ext cx="4130104" cy="1504874"/>
-          </a:xfrm>
-          <a:prstGeom prst="rect">
-            <a:avLst/>
-          </a:prstGeom>
-        </p:spPr>
-      </p:pic>
       <p:sp>
         <p:nvSpPr>
           <p:cNvPr id="13" name="Untertitel 12"/>
@@ -2622,6 +2592,47 @@
             <a:r>
               <a:rPr lang="de-DE" dirty="0"/>
               <a:t>2021-06-17</a:t>
+            </a:r>
+          </a:p>
+        </p:txBody>
+      </p:sp>
+      <p:sp>
+        <p:nvSpPr>
+          <p:cNvPr id="4" name="Textfeld 3">
+            <a:extLst>
+              <a:ext uri="{FF2B5EF4-FFF2-40B4-BE49-F238E27FC236}">
+                <a16:creationId xmlns:a16="http://schemas.microsoft.com/office/drawing/2014/main" id="{8C9E1514-A2B1-47D2-B9D3-DCE7D03C9B54}"/>
+              </a:ext>
+            </a:extLst>
+          </p:cNvPr>
+          <p:cNvSpPr txBox="1"/>
+          <p:nvPr/>
+        </p:nvSpPr>
+        <p:spPr>
+          <a:xfrm>
+            <a:off x="575800" y="695036"/>
+            <a:ext cx="3489951" cy="707886"/>
+          </a:xfrm>
+          <a:prstGeom prst="rect">
+            <a:avLst/>
+          </a:prstGeom>
+          <a:noFill/>
+        </p:spPr>
+        <p:txBody>
+          <a:bodyPr wrap="square" rtlCol="0">
+            <a:spAutoFit/>
+          </a:bodyPr>
+          <a:lstStyle/>
+          <a:p>
+            <a:r>
+              <a:rPr lang="de-DE" sz="4000" b="1" dirty="0">
+                <a:solidFill>
+                  <a:srgbClr val="13A39A"/>
+                </a:solidFill>
+                <a:latin typeface="Verdana" panose="020B0604030504040204" pitchFamily="34" charset="0"/>
+                <a:ea typeface="Verdana" panose="020B0604030504040204" pitchFamily="34" charset="0"/>
+              </a:rPr>
+              <a:t>m2docgen</a:t>
             </a:r>
           </a:p>
         </p:txBody>
@@ -5188,8 +5199,8 @@
           </p:nvSpPr>
           <p:spPr>
             <a:xfrm>
-              <a:off x="1374633" y="609125"/>
-              <a:ext cx="1218974" cy="330674"/>
+              <a:off x="1374632" y="609125"/>
+              <a:ext cx="1840281" cy="330674"/>
             </a:xfrm>
             <a:prstGeom prst="roundRect">
               <a:avLst>
@@ -5230,7 +5241,7 @@
                     <a:sysClr val="windowText" lastClr="000000"/>
                   </a:solidFill>
                 </a:rPr>
-                <a:t>Call m2doc</a:t>
+                <a:t>Call m2docgen</a:t>
               </a:r>
             </a:p>
           </p:txBody>
@@ -5294,6 +5305,7 @@
         <p:nvCxnSpPr>
           <p:cNvPr id="19" name="Gerade Verbindung mit Pfeil 18"/>
           <p:cNvCxnSpPr>
+            <a:cxnSpLocks/>
             <a:stCxn id="15" idx="3"/>
             <a:endCxn id="17" idx="1"/>
           </p:cNvCxnSpPr>
@@ -5301,8 +5313,8 @@
         </p:nvCxnSpPr>
         <p:spPr>
           <a:xfrm flipV="1">
-            <a:off x="1777178" y="771915"/>
-            <a:ext cx="897453" cy="2547"/>
+            <a:off x="2398484" y="771915"/>
+            <a:ext cx="276147" cy="2547"/>
           </a:xfrm>
           <a:prstGeom prst="straightConnector1">
             <a:avLst/>

</xml_diff>